<commit_message>
update to ppt figures
</commit_message>
<xml_diff>
--- a/Figures/additional_tasks.pptx
+++ b/Figures/additional_tasks.pptx
@@ -5,10 +5,11 @@
     <p:sldMasterId id="2147483648" r:id="rId1"/>
   </p:sldMasterIdLst>
   <p:notesMasterIdLst>
-    <p:notesMasterId r:id="rId3"/>
+    <p:notesMasterId r:id="rId4"/>
   </p:notesMasterIdLst>
   <p:sldIdLst>
     <p:sldId id="256" r:id="rId2"/>
+    <p:sldId id="257" r:id="rId3"/>
   </p:sldIdLst>
   <p:sldSz cx="12192000" cy="6858000"/>
   <p:notesSz cx="6858000" cy="9144000"/>
@@ -840,7 +841,7 @@
           <a:p>
             <a:fld id="{0470FDBD-C69E-4901-9654-1D3EC2EAAD1B}" type="datetimeFigureOut">
               <a:rPr lang="es-ES" smtClean="0"/>
-              <a:t>26/07/2025</a:t>
+              <a:t>15/9/25</a:t>
             </a:fld>
             <a:endParaRPr lang="es-ES"/>
           </a:p>
@@ -1257,7 +1258,7 @@
           <a:p>
             <a:fld id="{6BF4D44D-EE01-4CA8-B2F7-D3B3DD40F3E5}" type="datetimeFigureOut">
               <a:rPr lang="es-ES" smtClean="0"/>
-              <a:t>26/07/2025</a:t>
+              <a:t>15/9/25</a:t>
             </a:fld>
             <a:endParaRPr lang="es-ES"/>
           </a:p>
@@ -1457,7 +1458,7 @@
           <a:p>
             <a:fld id="{6BF4D44D-EE01-4CA8-B2F7-D3B3DD40F3E5}" type="datetimeFigureOut">
               <a:rPr lang="es-ES" smtClean="0"/>
-              <a:t>26/07/2025</a:t>
+              <a:t>15/9/25</a:t>
             </a:fld>
             <a:endParaRPr lang="es-ES"/>
           </a:p>
@@ -1667,7 +1668,7 @@
           <a:p>
             <a:fld id="{6BF4D44D-EE01-4CA8-B2F7-D3B3DD40F3E5}" type="datetimeFigureOut">
               <a:rPr lang="es-ES" smtClean="0"/>
-              <a:t>26/07/2025</a:t>
+              <a:t>15/9/25</a:t>
             </a:fld>
             <a:endParaRPr lang="es-ES"/>
           </a:p>
@@ -1867,7 +1868,7 @@
           <a:p>
             <a:fld id="{6BF4D44D-EE01-4CA8-B2F7-D3B3DD40F3E5}" type="datetimeFigureOut">
               <a:rPr lang="es-ES" smtClean="0"/>
-              <a:t>26/07/2025</a:t>
+              <a:t>15/9/25</a:t>
             </a:fld>
             <a:endParaRPr lang="es-ES"/>
           </a:p>
@@ -2143,7 +2144,7 @@
           <a:p>
             <a:fld id="{6BF4D44D-EE01-4CA8-B2F7-D3B3DD40F3E5}" type="datetimeFigureOut">
               <a:rPr lang="es-ES" smtClean="0"/>
-              <a:t>26/07/2025</a:t>
+              <a:t>15/9/25</a:t>
             </a:fld>
             <a:endParaRPr lang="es-ES"/>
           </a:p>
@@ -2411,7 +2412,7 @@
           <a:p>
             <a:fld id="{6BF4D44D-EE01-4CA8-B2F7-D3B3DD40F3E5}" type="datetimeFigureOut">
               <a:rPr lang="es-ES" smtClean="0"/>
-              <a:t>26/07/2025</a:t>
+              <a:t>15/9/25</a:t>
             </a:fld>
             <a:endParaRPr lang="es-ES"/>
           </a:p>
@@ -2826,7 +2827,7 @@
           <a:p>
             <a:fld id="{6BF4D44D-EE01-4CA8-B2F7-D3B3DD40F3E5}" type="datetimeFigureOut">
               <a:rPr lang="es-ES" smtClean="0"/>
-              <a:t>26/07/2025</a:t>
+              <a:t>15/9/25</a:t>
             </a:fld>
             <a:endParaRPr lang="es-ES"/>
           </a:p>
@@ -2968,7 +2969,7 @@
           <a:p>
             <a:fld id="{6BF4D44D-EE01-4CA8-B2F7-D3B3DD40F3E5}" type="datetimeFigureOut">
               <a:rPr lang="es-ES" smtClean="0"/>
-              <a:t>26/07/2025</a:t>
+              <a:t>15/9/25</a:t>
             </a:fld>
             <a:endParaRPr lang="es-ES"/>
           </a:p>
@@ -3081,7 +3082,7 @@
           <a:p>
             <a:fld id="{6BF4D44D-EE01-4CA8-B2F7-D3B3DD40F3E5}" type="datetimeFigureOut">
               <a:rPr lang="es-ES" smtClean="0"/>
-              <a:t>26/07/2025</a:t>
+              <a:t>15/9/25</a:t>
             </a:fld>
             <a:endParaRPr lang="es-ES"/>
           </a:p>
@@ -3394,7 +3395,7 @@
           <a:p>
             <a:fld id="{6BF4D44D-EE01-4CA8-B2F7-D3B3DD40F3E5}" type="datetimeFigureOut">
               <a:rPr lang="es-ES" smtClean="0"/>
-              <a:t>26/07/2025</a:t>
+              <a:t>15/9/25</a:t>
             </a:fld>
             <a:endParaRPr lang="es-ES"/>
           </a:p>
@@ -3683,7 +3684,7 @@
           <a:p>
             <a:fld id="{6BF4D44D-EE01-4CA8-B2F7-D3B3DD40F3E5}" type="datetimeFigureOut">
               <a:rPr lang="es-ES" smtClean="0"/>
-              <a:t>26/07/2025</a:t>
+              <a:t>15/9/25</a:t>
             </a:fld>
             <a:endParaRPr lang="es-ES"/>
           </a:p>
@@ -3926,7 +3927,7 @@
           <a:p>
             <a:fld id="{6BF4D44D-EE01-4CA8-B2F7-D3B3DD40F3E5}" type="datetimeFigureOut">
               <a:rPr lang="es-ES" smtClean="0"/>
-              <a:t>26/07/2025</a:t>
+              <a:t>15/9/25</a:t>
             </a:fld>
             <a:endParaRPr lang="es-ES"/>
           </a:p>
@@ -4343,414 +4344,6 @@
           <a:chExt cx="0" cy="0"/>
         </a:xfrm>
       </p:grpSpPr>
-      <p:graphicFrame>
-        <p:nvGraphicFramePr>
-          <p:cNvPr id="6" name="Table 5">
-            <a:extLst>
-              <a:ext uri="{FF2B5EF4-FFF2-40B4-BE49-F238E27FC236}">
-                <a16:creationId xmlns:a16="http://schemas.microsoft.com/office/drawing/2014/main" id="{B44B9C8F-72E0-5990-74C3-DB30E971E439}"/>
-              </a:ext>
-            </a:extLst>
-          </p:cNvPr>
-          <p:cNvGraphicFramePr>
-            <a:graphicFrameLocks noGrp="1"/>
-          </p:cNvGraphicFramePr>
-          <p:nvPr>
-            <p:extLst>
-              <p:ext uri="{D42A27DB-BD31-4B8C-83A1-F6EECF244321}">
-                <p14:modId xmlns:p14="http://schemas.microsoft.com/office/powerpoint/2010/main" val="3484925073"/>
-              </p:ext>
-            </p:extLst>
-          </p:nvPr>
-        </p:nvGraphicFramePr>
-        <p:xfrm>
-          <a:off x="419724" y="239842"/>
-          <a:ext cx="11242624" cy="6340840"/>
-        </p:xfrm>
-        <a:graphic>
-          <a:graphicData uri="http://schemas.openxmlformats.org/drawingml/2006/table">
-            <a:tbl>
-              <a:tblPr firstRow="1" bandRow="1">
-                <a:tableStyleId>{5940675A-B579-460E-94D1-54222C63F5DA}</a:tableStyleId>
-              </a:tblPr>
-              <a:tblGrid>
-                <a:gridCol w="5621312">
-                  <a:extLst>
-                    <a:ext uri="{9D8B030D-6E8A-4147-A177-3AD203B41FA5}">
-                      <a16:colId xmlns:a16="http://schemas.microsoft.com/office/drawing/2014/main" val="1625570102"/>
-                    </a:ext>
-                  </a:extLst>
-                </a:gridCol>
-                <a:gridCol w="5621312">
-                  <a:extLst>
-                    <a:ext uri="{9D8B030D-6E8A-4147-A177-3AD203B41FA5}">
-                      <a16:colId xmlns:a16="http://schemas.microsoft.com/office/drawing/2014/main" val="1788209011"/>
-                    </a:ext>
-                  </a:extLst>
-                </a:gridCol>
-              </a:tblGrid>
-              <a:tr h="566250">
-                <a:tc>
-                  <a:txBody>
-                    <a:bodyPr/>
-                    <a:lstStyle/>
-                    <a:p>
-                      <a:pPr algn="ctr"/>
-                      <a:r>
-                        <a:rPr lang="es-ES" sz="2000" b="1" dirty="0">
-                          <a:solidFill>
-                            <a:schemeClr val="bg1"/>
-                          </a:solidFill>
-                        </a:rPr>
-                        <a:t>Animal Stroop Task</a:t>
-                      </a:r>
-                    </a:p>
-                  </a:txBody>
-                  <a:tcPr>
-                    <a:lnL w="12700" cmpd="sng">
-                      <a:noFill/>
-                    </a:lnL>
-                    <a:lnR w="12700" cap="flat" cmpd="sng" algn="ctr">
-                      <a:solidFill>
-                        <a:schemeClr val="tx1"/>
-                      </a:solidFill>
-                      <a:prstDash val="solid"/>
-                      <a:round/>
-                      <a:headEnd type="none" w="med" len="med"/>
-                      <a:tailEnd type="none" w="med" len="med"/>
-                    </a:lnR>
-                    <a:lnT w="12700" cmpd="sng">
-                      <a:noFill/>
-                    </a:lnT>
-                    <a:lnB w="12700" cap="flat" cmpd="sng" algn="ctr">
-                      <a:noFill/>
-                      <a:prstDash val="solid"/>
-                      <a:round/>
-                      <a:headEnd type="none" w="med" len="med"/>
-                      <a:tailEnd type="none" w="med" len="med"/>
-                    </a:lnB>
-                    <a:lnTlToBr w="12700" cmpd="sng">
-                      <a:noFill/>
-                      <a:prstDash val="solid"/>
-                    </a:lnTlToBr>
-                    <a:lnBlToTr w="12700" cmpd="sng">
-                      <a:noFill/>
-                      <a:prstDash val="solid"/>
-                    </a:lnBlToTr>
-                    <a:solidFill>
-                      <a:srgbClr val="47B090"/>
-                    </a:solidFill>
-                  </a:tcPr>
-                </a:tc>
-                <a:tc>
-                  <a:txBody>
-                    <a:bodyPr/>
-                    <a:lstStyle/>
-                    <a:p>
-                      <a:pPr algn="ctr"/>
-                      <a:r>
-                        <a:rPr lang="es-ES" sz="2000" b="1" kern="1200" dirty="0">
-                          <a:solidFill>
-                            <a:schemeClr val="bg1"/>
-                          </a:solidFill>
-                          <a:latin typeface="+mn-lt"/>
-                          <a:ea typeface="+mn-ea"/>
-                          <a:cs typeface="+mn-cs"/>
-                        </a:rPr>
-                        <a:t>Theory of Mind (ToM) task</a:t>
-                      </a:r>
-                    </a:p>
-                  </a:txBody>
-                  <a:tcPr>
-                    <a:lnL w="12700" cap="flat" cmpd="sng" algn="ctr">
-                      <a:solidFill>
-                        <a:schemeClr val="tx1"/>
-                      </a:solidFill>
-                      <a:prstDash val="solid"/>
-                      <a:round/>
-                      <a:headEnd type="none" w="med" len="med"/>
-                      <a:tailEnd type="none" w="med" len="med"/>
-                    </a:lnL>
-                    <a:lnR w="12700" cmpd="sng">
-                      <a:noFill/>
-                    </a:lnR>
-                    <a:lnT w="12700" cmpd="sng">
-                      <a:noFill/>
-                    </a:lnT>
-                    <a:lnB w="12700" cmpd="sng">
-                      <a:noFill/>
-                    </a:lnB>
-                    <a:lnTlToBr w="12700" cmpd="sng">
-                      <a:noFill/>
-                      <a:prstDash val="solid"/>
-                    </a:lnTlToBr>
-                    <a:lnBlToTr w="12700" cmpd="sng">
-                      <a:noFill/>
-                      <a:prstDash val="solid"/>
-                    </a:lnBlToTr>
-                    <a:solidFill>
-                      <a:srgbClr val="47B090"/>
-                    </a:solidFill>
-                  </a:tcPr>
-                </a:tc>
-                <a:extLst>
-                  <a:ext uri="{0D108BD9-81ED-4DB2-BD59-A6C34878D82A}">
-                    <a16:rowId xmlns:a16="http://schemas.microsoft.com/office/drawing/2014/main" val="864910458"/>
-                  </a:ext>
-                </a:extLst>
-              </a:tr>
-              <a:tr h="2603586">
-                <a:tc>
-                  <a:txBody>
-                    <a:bodyPr/>
-                    <a:lstStyle/>
-                    <a:p>
-                      <a:endParaRPr lang="es-ES" dirty="0"/>
-                    </a:p>
-                  </a:txBody>
-                  <a:tcPr>
-                    <a:lnL w="12700" cmpd="sng">
-                      <a:noFill/>
-                    </a:lnL>
-                    <a:lnR w="12700" cap="flat" cmpd="sng" algn="ctr">
-                      <a:solidFill>
-                        <a:schemeClr val="tx1"/>
-                      </a:solidFill>
-                      <a:prstDash val="solid"/>
-                      <a:round/>
-                      <a:headEnd type="none" w="med" len="med"/>
-                      <a:tailEnd type="none" w="med" len="med"/>
-                    </a:lnR>
-                    <a:lnT w="12700" cap="flat" cmpd="sng" algn="ctr">
-                      <a:noFill/>
-                      <a:prstDash val="solid"/>
-                      <a:round/>
-                      <a:headEnd type="none" w="med" len="med"/>
-                      <a:tailEnd type="none" w="med" len="med"/>
-                    </a:lnT>
-                    <a:lnB w="12700" cap="flat" cmpd="sng" algn="ctr">
-                      <a:noFill/>
-                      <a:prstDash val="solid"/>
-                      <a:round/>
-                      <a:headEnd type="none" w="med" len="med"/>
-                      <a:tailEnd type="none" w="med" len="med"/>
-                    </a:lnB>
-                    <a:lnTlToBr w="12700" cmpd="sng">
-                      <a:noFill/>
-                      <a:prstDash val="solid"/>
-                    </a:lnTlToBr>
-                    <a:lnBlToTr w="12700" cmpd="sng">
-                      <a:noFill/>
-                      <a:prstDash val="solid"/>
-                    </a:lnBlToTr>
-                    <a:solidFill>
-                      <a:srgbClr val="D0ECE4"/>
-                    </a:solidFill>
-                  </a:tcPr>
-                </a:tc>
-                <a:tc rowSpan="3">
-                  <a:txBody>
-                    <a:bodyPr/>
-                    <a:lstStyle/>
-                    <a:p>
-                      <a:endParaRPr lang="es-ES" dirty="0"/>
-                    </a:p>
-                  </a:txBody>
-                  <a:tcPr>
-                    <a:lnL w="12700" cap="flat" cmpd="sng" algn="ctr">
-                      <a:solidFill>
-                        <a:schemeClr val="tx1"/>
-                      </a:solidFill>
-                      <a:prstDash val="solid"/>
-                      <a:round/>
-                      <a:headEnd type="none" w="med" len="med"/>
-                      <a:tailEnd type="none" w="med" len="med"/>
-                    </a:lnL>
-                    <a:lnR w="12700" cmpd="sng">
-                      <a:noFill/>
-                    </a:lnR>
-                    <a:lnT w="12700" cmpd="sng">
-                      <a:noFill/>
-                    </a:lnT>
-                    <a:lnB w="12700" cmpd="sng">
-                      <a:noFill/>
-                    </a:lnB>
-                    <a:lnTlToBr w="12700" cmpd="sng">
-                      <a:noFill/>
-                      <a:prstDash val="solid"/>
-                    </a:lnTlToBr>
-                    <a:lnBlToTr w="12700" cmpd="sng">
-                      <a:noFill/>
-                      <a:prstDash val="solid"/>
-                    </a:lnBlToTr>
-                    <a:solidFill>
-                      <a:srgbClr val="D0ECE4"/>
-                    </a:solidFill>
-                  </a:tcPr>
-                </a:tc>
-                <a:extLst>
-                  <a:ext uri="{0D108BD9-81ED-4DB2-BD59-A6C34878D82A}">
-                    <a16:rowId xmlns:a16="http://schemas.microsoft.com/office/drawing/2014/main" val="1926323004"/>
-                  </a:ext>
-                </a:extLst>
-              </a:tr>
-              <a:tr h="567418">
-                <a:tc>
-                  <a:txBody>
-                    <a:bodyPr/>
-                    <a:lstStyle/>
-                    <a:p>
-                      <a:pPr algn="ctr"/>
-                      <a:r>
-                        <a:rPr lang="es-ES" sz="2000" b="1" dirty="0">
-                          <a:solidFill>
-                            <a:schemeClr val="bg1"/>
-                          </a:solidFill>
-                        </a:rPr>
-                        <a:t>Digit </a:t>
-                      </a:r>
-                      <a:r>
-                        <a:rPr lang="es-ES" sz="2000" b="1" kern="1200" dirty="0">
-                          <a:solidFill>
-                            <a:schemeClr val="bg1"/>
-                          </a:solidFill>
-                          <a:latin typeface="+mn-lt"/>
-                          <a:ea typeface="+mn-ea"/>
-                          <a:cs typeface="+mn-cs"/>
-                        </a:rPr>
-                        <a:t>Span</a:t>
-                      </a:r>
-                      <a:r>
-                        <a:rPr lang="es-ES" sz="2000" b="1" dirty="0">
-                          <a:solidFill>
-                            <a:schemeClr val="bg1"/>
-                          </a:solidFill>
-                        </a:rPr>
-                        <a:t> Task</a:t>
-                      </a:r>
-                    </a:p>
-                  </a:txBody>
-                  <a:tcPr>
-                    <a:lnL w="12700" cmpd="sng">
-                      <a:noFill/>
-                    </a:lnL>
-                    <a:lnR w="12700" cap="flat" cmpd="sng" algn="ctr">
-                      <a:solidFill>
-                        <a:schemeClr val="tx1"/>
-                      </a:solidFill>
-                      <a:prstDash val="solid"/>
-                      <a:round/>
-                      <a:headEnd type="none" w="med" len="med"/>
-                      <a:tailEnd type="none" w="med" len="med"/>
-                    </a:lnR>
-                    <a:lnT w="12700" cap="flat" cmpd="sng" algn="ctr">
-                      <a:noFill/>
-                      <a:prstDash val="solid"/>
-                      <a:round/>
-                      <a:headEnd type="none" w="med" len="med"/>
-                      <a:tailEnd type="none" w="med" len="med"/>
-                    </a:lnT>
-                    <a:lnB w="12700" cap="flat" cmpd="sng" algn="ctr">
-                      <a:noFill/>
-                      <a:prstDash val="solid"/>
-                      <a:round/>
-                      <a:headEnd type="none" w="med" len="med"/>
-                      <a:tailEnd type="none" w="med" len="med"/>
-                    </a:lnB>
-                    <a:lnTlToBr w="12700" cmpd="sng">
-                      <a:noFill/>
-                      <a:prstDash val="solid"/>
-                    </a:lnTlToBr>
-                    <a:lnBlToTr w="12700" cmpd="sng">
-                      <a:noFill/>
-                      <a:prstDash val="solid"/>
-                    </a:lnBlToTr>
-                    <a:solidFill>
-                      <a:srgbClr val="47B090"/>
-                    </a:solidFill>
-                  </a:tcPr>
-                </a:tc>
-                <a:tc vMerge="1">
-                  <a:txBody>
-                    <a:bodyPr/>
-                    <a:lstStyle/>
-                    <a:p>
-                      <a:endParaRPr lang="es-ES" dirty="0"/>
-                    </a:p>
-                  </a:txBody>
-                  <a:tcPr/>
-                </a:tc>
-                <a:extLst>
-                  <a:ext uri="{0D108BD9-81ED-4DB2-BD59-A6C34878D82A}">
-                    <a16:rowId xmlns:a16="http://schemas.microsoft.com/office/drawing/2014/main" val="3761987470"/>
-                  </a:ext>
-                </a:extLst>
-              </a:tr>
-              <a:tr h="2603586">
-                <a:tc>
-                  <a:txBody>
-                    <a:bodyPr/>
-                    <a:lstStyle/>
-                    <a:p>
-                      <a:endParaRPr lang="es-ES" dirty="0"/>
-                    </a:p>
-                  </a:txBody>
-                  <a:tcPr>
-                    <a:lnL w="12700" cmpd="sng">
-                      <a:noFill/>
-                    </a:lnL>
-                    <a:lnR w="12700" cap="flat" cmpd="sng" algn="ctr">
-                      <a:solidFill>
-                        <a:schemeClr val="tx1"/>
-                      </a:solidFill>
-                      <a:prstDash val="solid"/>
-                      <a:round/>
-                      <a:headEnd type="none" w="med" len="med"/>
-                      <a:tailEnd type="none" w="med" len="med"/>
-                    </a:lnR>
-                    <a:lnT w="12700" cap="flat" cmpd="sng" algn="ctr">
-                      <a:noFill/>
-                      <a:prstDash val="solid"/>
-                      <a:round/>
-                      <a:headEnd type="none" w="med" len="med"/>
-                      <a:tailEnd type="none" w="med" len="med"/>
-                    </a:lnT>
-                    <a:lnB w="12700" cmpd="sng">
-                      <a:noFill/>
-                    </a:lnB>
-                    <a:lnTlToBr w="12700" cmpd="sng">
-                      <a:noFill/>
-                      <a:prstDash val="solid"/>
-                    </a:lnTlToBr>
-                    <a:lnBlToTr w="12700" cmpd="sng">
-                      <a:noFill/>
-                      <a:prstDash val="solid"/>
-                    </a:lnBlToTr>
-                    <a:solidFill>
-                      <a:srgbClr val="D0ECE4"/>
-                    </a:solidFill>
-                  </a:tcPr>
-                </a:tc>
-                <a:tc vMerge="1">
-                  <a:txBody>
-                    <a:bodyPr/>
-                    <a:lstStyle/>
-                    <a:p>
-                      <a:endParaRPr lang="es-ES" dirty="0"/>
-                    </a:p>
-                  </a:txBody>
-                  <a:tcPr/>
-                </a:tc>
-                <a:extLst>
-                  <a:ext uri="{0D108BD9-81ED-4DB2-BD59-A6C34878D82A}">
-                    <a16:rowId xmlns:a16="http://schemas.microsoft.com/office/drawing/2014/main" val="3176342416"/>
-                  </a:ext>
-                </a:extLst>
-              </a:tr>
-            </a:tbl>
-          </a:graphicData>
-        </a:graphic>
-      </p:graphicFrame>
       <p:sp>
         <p:nvSpPr>
           <p:cNvPr id="7" name="Rectangle 6">
@@ -4765,7 +4358,7 @@
         </p:nvSpPr>
         <p:spPr>
           <a:xfrm>
-            <a:off x="900659" y="1249605"/>
+            <a:off x="1322655" y="984778"/>
             <a:ext cx="1244184" cy="1124261"/>
           </a:xfrm>
           <a:prstGeom prst="rect">
@@ -4798,7 +4391,7 @@
           <a:lstStyle/>
           <a:p>
             <a:pPr algn="ctr"/>
-            <a:endParaRPr lang="es-ES"/>
+            <a:endParaRPr lang="en-US" noProof="0" dirty="0"/>
           </a:p>
         </p:txBody>
       </p:sp>
@@ -4816,7 +4409,7 @@
         </p:nvSpPr>
         <p:spPr>
           <a:xfrm>
-            <a:off x="4402421" y="2218544"/>
+            <a:off x="4269784" y="2137488"/>
             <a:ext cx="983224" cy="612522"/>
           </a:xfrm>
           <a:prstGeom prst="wedgeRoundRectCallout">
@@ -4851,7 +4444,7 @@
           <a:lstStyle/>
           <a:p>
             <a:pPr algn="ctr"/>
-            <a:endParaRPr lang="es-ES"/>
+            <a:endParaRPr lang="en-US" noProof="0" dirty="0"/>
           </a:p>
         </p:txBody>
       </p:sp>
@@ -4869,8 +4462,8 @@
         </p:nvSpPr>
         <p:spPr>
           <a:xfrm>
-            <a:off x="4567003" y="2341600"/>
-            <a:ext cx="818642" cy="369332"/>
+            <a:off x="4269784" y="2260544"/>
+            <a:ext cx="983224" cy="369332"/>
           </a:xfrm>
           <a:prstGeom prst="rect">
             <a:avLst/>
@@ -4883,9 +4476,14 @@
           </a:bodyPr>
           <a:lstStyle/>
           <a:p>
-            <a:r>
-              <a:rPr lang="es-ES" dirty="0"/>
-              <a:t>vaca</a:t>
+            <a:pPr algn="ctr"/>
+            <a:r>
+              <a:rPr lang="en-US" noProof="0" dirty="0">
+                <a:latin typeface="Helvetica Neue" panose="02000503000000020004" pitchFamily="2" charset="0"/>
+                <a:ea typeface="Helvetica Neue" panose="02000503000000020004" pitchFamily="2" charset="0"/>
+                <a:cs typeface="Helvetica Neue" panose="02000503000000020004" pitchFamily="2" charset="0"/>
+              </a:rPr>
+              <a:t>cow</a:t>
             </a:r>
           </a:p>
         </p:txBody>
@@ -4904,7 +4502,7 @@
         </p:nvSpPr>
         <p:spPr>
           <a:xfrm>
-            <a:off x="908777" y="4620144"/>
+            <a:off x="1236496" y="4783516"/>
             <a:ext cx="823211" cy="516039"/>
           </a:xfrm>
           <a:prstGeom prst="wedgeRoundRectCallout">
@@ -4939,7 +4537,7 @@
           <a:lstStyle/>
           <a:p>
             <a:pPr algn="ctr"/>
-            <a:endParaRPr lang="es-ES" dirty="0"/>
+            <a:endParaRPr lang="en-US" noProof="0" dirty="0"/>
           </a:p>
         </p:txBody>
       </p:sp>
@@ -4957,8 +4555,8 @@
         </p:nvSpPr>
         <p:spPr>
           <a:xfrm>
-            <a:off x="788233" y="793847"/>
-            <a:ext cx="1469036" cy="369332"/>
+            <a:off x="2136809" y="441677"/>
+            <a:ext cx="2404671" cy="369332"/>
           </a:xfrm>
           <a:prstGeom prst="rect">
             <a:avLst/>
@@ -4971,127 +4569,33 @@
           </a:bodyPr>
           <a:lstStyle/>
           <a:p>
-            <a:r>
-              <a:rPr lang="es-ES" b="1" dirty="0" err="1">
-                <a:solidFill>
-                  <a:srgbClr val="52A68E"/>
-                </a:solidFill>
+            <a:pPr algn="ctr"/>
+            <a:r>
+              <a:rPr lang="en-US" noProof="0" dirty="0">
+                <a:latin typeface="Helvetica Neue" panose="02000503000000020004" pitchFamily="2" charset="0"/>
+                <a:ea typeface="Helvetica Neue" panose="02000503000000020004" pitchFamily="2" charset="0"/>
+                <a:cs typeface="Helvetica Neue" panose="02000503000000020004" pitchFamily="2" charset="0"/>
               </a:rPr>
-              <a:t>Inhibition</a:t>
-            </a:r>
-            <a:endParaRPr lang="es-ES" b="1" dirty="0">
-              <a:solidFill>
-                <a:srgbClr val="52A68E"/>
-              </a:solidFill>
-            </a:endParaRPr>
-          </a:p>
-        </p:txBody>
-      </p:sp>
-      <p:sp>
-        <p:nvSpPr>
-          <p:cNvPr id="29" name="TextBox 28">
-            <a:extLst>
-              <a:ext uri="{FF2B5EF4-FFF2-40B4-BE49-F238E27FC236}">
-                <a16:creationId xmlns:a16="http://schemas.microsoft.com/office/drawing/2014/main" id="{523DB37D-4026-9ED1-EB9E-B6C6C3066C6E}"/>
-              </a:ext>
-            </a:extLst>
-          </p:cNvPr>
-          <p:cNvSpPr txBox="1"/>
+              <a:t>Response inhibition</a:t>
+            </a:r>
+          </a:p>
+        </p:txBody>
+      </p:sp>
+      <p:sp>
+        <p:nvSpPr>
+          <p:cNvPr id="31" name="Speech Bubble: Rectangle with Corners Rounded 30">
+            <a:extLst>
+              <a:ext uri="{FF2B5EF4-FFF2-40B4-BE49-F238E27FC236}">
+                <a16:creationId xmlns:a16="http://schemas.microsoft.com/office/drawing/2014/main" id="{FCD62593-088F-0FBD-796D-1624F013F5F9}"/>
+              </a:ext>
+            </a:extLst>
+          </p:cNvPr>
+          <p:cNvSpPr/>
           <p:nvPr/>
         </p:nvSpPr>
         <p:spPr>
           <a:xfrm>
-            <a:off x="689860" y="4077960"/>
-            <a:ext cx="2404672" cy="369332"/>
-          </a:xfrm>
-          <a:prstGeom prst="rect">
-            <a:avLst/>
-          </a:prstGeom>
-          <a:noFill/>
-        </p:spPr>
-        <p:txBody>
-          <a:bodyPr wrap="square" rtlCol="0">
-            <a:spAutoFit/>
-          </a:bodyPr>
-          <a:lstStyle/>
-          <a:p>
-            <a:r>
-              <a:rPr lang="es-ES" b="1" noProof="1">
-                <a:solidFill>
-                  <a:srgbClr val="47B090"/>
-                </a:solidFill>
-              </a:rPr>
-              <a:t>Short-term</a:t>
-            </a:r>
-            <a:r>
-              <a:rPr lang="es-ES" b="1" noProof="1"/>
-              <a:t> </a:t>
-            </a:r>
-            <a:r>
-              <a:rPr lang="es-ES" b="1" noProof="1">
-                <a:solidFill>
-                  <a:srgbClr val="47B090"/>
-                </a:solidFill>
-              </a:rPr>
-              <a:t>memory</a:t>
-            </a:r>
-          </a:p>
-        </p:txBody>
-      </p:sp>
-      <p:sp>
-        <p:nvSpPr>
-          <p:cNvPr id="30" name="TextBox 29">
-            <a:extLst>
-              <a:ext uri="{FF2B5EF4-FFF2-40B4-BE49-F238E27FC236}">
-                <a16:creationId xmlns:a16="http://schemas.microsoft.com/office/drawing/2014/main" id="{0BBBB5A2-F607-E7FD-5142-A0FD6CED9514}"/>
-              </a:ext>
-            </a:extLst>
-          </p:cNvPr>
-          <p:cNvSpPr txBox="1"/>
-          <p:nvPr/>
-        </p:nvSpPr>
-        <p:spPr>
-          <a:xfrm>
-            <a:off x="3364667" y="4085247"/>
-            <a:ext cx="2404672" cy="369332"/>
-          </a:xfrm>
-          <a:prstGeom prst="rect">
-            <a:avLst/>
-          </a:prstGeom>
-          <a:noFill/>
-        </p:spPr>
-        <p:txBody>
-          <a:bodyPr wrap="square" rtlCol="0">
-            <a:spAutoFit/>
-          </a:bodyPr>
-          <a:lstStyle/>
-          <a:p>
-            <a:r>
-              <a:rPr lang="es-ES" b="1" dirty="0">
-                <a:solidFill>
-                  <a:srgbClr val="47B090"/>
-                </a:solidFill>
-              </a:rPr>
-              <a:t>Working memory</a:t>
-            </a:r>
-          </a:p>
-        </p:txBody>
-      </p:sp>
-      <p:sp>
-        <p:nvSpPr>
-          <p:cNvPr id="31" name="Speech Bubble: Rectangle with Corners Rounded 30">
-            <a:extLst>
-              <a:ext uri="{FF2B5EF4-FFF2-40B4-BE49-F238E27FC236}">
-                <a16:creationId xmlns:a16="http://schemas.microsoft.com/office/drawing/2014/main" id="{FCD62593-088F-0FBD-796D-1624F013F5F9}"/>
-              </a:ext>
-            </a:extLst>
-          </p:cNvPr>
-          <p:cNvSpPr/>
-          <p:nvPr/>
-        </p:nvSpPr>
-        <p:spPr>
-          <a:xfrm>
-            <a:off x="1818493" y="5350375"/>
+            <a:off x="2146212" y="5513747"/>
             <a:ext cx="823211" cy="516039"/>
           </a:xfrm>
           <a:prstGeom prst="wedgeRoundRectCallout">
@@ -5126,7 +4630,7 @@
           <a:lstStyle/>
           <a:p>
             <a:pPr algn="ctr"/>
-            <a:endParaRPr lang="es-ES" dirty="0"/>
+            <a:endParaRPr lang="en-US" noProof="0" dirty="0"/>
           </a:p>
         </p:txBody>
       </p:sp>
@@ -5144,7 +4648,7 @@
         </p:nvSpPr>
         <p:spPr>
           <a:xfrm>
-            <a:off x="3664468" y="4620143"/>
+            <a:off x="3836986" y="4783515"/>
             <a:ext cx="823211" cy="516039"/>
           </a:xfrm>
           <a:prstGeom prst="wedgeRoundRectCallout">
@@ -5179,7 +4683,7 @@
           <a:lstStyle/>
           <a:p>
             <a:pPr algn="ctr"/>
-            <a:endParaRPr lang="es-ES" dirty="0"/>
+            <a:endParaRPr lang="en-US" noProof="0" dirty="0"/>
           </a:p>
         </p:txBody>
       </p:sp>
@@ -5197,7 +4701,7 @@
         </p:nvSpPr>
         <p:spPr>
           <a:xfrm>
-            <a:off x="4487679" y="5350375"/>
+            <a:off x="4660197" y="5513747"/>
             <a:ext cx="823211" cy="516039"/>
           </a:xfrm>
           <a:prstGeom prst="wedgeRoundRectCallout">
@@ -5232,7 +4736,7 @@
           <a:lstStyle/>
           <a:p>
             <a:pPr algn="ctr"/>
-            <a:endParaRPr lang="es-ES" dirty="0"/>
+            <a:endParaRPr lang="en-US" noProof="0" dirty="0"/>
           </a:p>
         </p:txBody>
       </p:sp>
@@ -5250,7 +4754,7 @@
         </p:nvSpPr>
         <p:spPr>
           <a:xfrm>
-            <a:off x="994034" y="4708885"/>
+            <a:off x="1321753" y="4872257"/>
             <a:ext cx="652696" cy="338554"/>
           </a:xfrm>
           <a:prstGeom prst="rect">
@@ -5265,7 +4769,7 @@
           <a:lstStyle/>
           <a:p>
             <a:r>
-              <a:rPr lang="es-ES" sz="1600" dirty="0"/>
+              <a:rPr lang="en-US" sz="1600" noProof="0" dirty="0"/>
               <a:t>3-9-6</a:t>
             </a:r>
           </a:p>
@@ -5285,7 +4789,7 @@
         </p:nvSpPr>
         <p:spPr>
           <a:xfrm>
-            <a:off x="1903750" y="5439117"/>
+            <a:off x="2231469" y="5602489"/>
             <a:ext cx="652696" cy="338554"/>
           </a:xfrm>
           <a:prstGeom prst="rect">
@@ -5300,7 +4804,7 @@
           <a:lstStyle/>
           <a:p>
             <a:r>
-              <a:rPr lang="es-ES" sz="1600" dirty="0"/>
+              <a:rPr lang="en-US" sz="1600" noProof="0" dirty="0"/>
               <a:t>3-9-6</a:t>
             </a:r>
           </a:p>
@@ -5320,7 +4824,7 @@
         </p:nvSpPr>
         <p:spPr>
           <a:xfrm>
-            <a:off x="3749725" y="4708480"/>
+            <a:off x="3922243" y="4871852"/>
             <a:ext cx="652696" cy="338554"/>
           </a:xfrm>
           <a:prstGeom prst="rect">
@@ -5335,7 +4839,7 @@
           <a:lstStyle/>
           <a:p>
             <a:r>
-              <a:rPr lang="es-ES" sz="1600" dirty="0"/>
+              <a:rPr lang="en-US" sz="1600" noProof="0" dirty="0"/>
               <a:t>5-2-7</a:t>
             </a:r>
           </a:p>
@@ -5355,7 +4859,7 @@
         </p:nvSpPr>
         <p:spPr>
           <a:xfrm>
-            <a:off x="4567003" y="5439117"/>
+            <a:off x="4739521" y="5602489"/>
             <a:ext cx="652696" cy="338554"/>
           </a:xfrm>
           <a:prstGeom prst="rect">
@@ -5370,7 +4874,7 @@
           <a:lstStyle/>
           <a:p>
             <a:r>
-              <a:rPr lang="es-ES" sz="1600" dirty="0"/>
+              <a:rPr lang="en-US" sz="1600" noProof="0" dirty="0"/>
               <a:t>7-2-5</a:t>
             </a:r>
           </a:p>
@@ -5390,7 +4894,7 @@
         </p:nvSpPr>
         <p:spPr>
           <a:xfrm>
-            <a:off x="1053059" y="1402005"/>
+            <a:off x="1475055" y="1137178"/>
             <a:ext cx="1244184" cy="1124261"/>
           </a:xfrm>
           <a:prstGeom prst="rect">
@@ -5423,7 +4927,7 @@
           <a:lstStyle/>
           <a:p>
             <a:pPr algn="ctr"/>
-            <a:endParaRPr lang="es-ES"/>
+            <a:endParaRPr lang="en-US" noProof="0" dirty="0"/>
           </a:p>
         </p:txBody>
       </p:sp>
@@ -5441,7 +4945,7 @@
         </p:nvSpPr>
         <p:spPr>
           <a:xfrm>
-            <a:off x="1205459" y="1554405"/>
+            <a:off x="1627455" y="1289578"/>
             <a:ext cx="1244184" cy="1124261"/>
           </a:xfrm>
           <a:prstGeom prst="rect">
@@ -5474,7 +4978,7 @@
           <a:lstStyle/>
           <a:p>
             <a:pPr algn="ctr"/>
-            <a:endParaRPr lang="es-ES"/>
+            <a:endParaRPr lang="en-US" noProof="0" dirty="0"/>
           </a:p>
         </p:txBody>
       </p:sp>
@@ -5492,7 +4996,7 @@
         </p:nvSpPr>
         <p:spPr>
           <a:xfrm>
-            <a:off x="1357859" y="1706805"/>
+            <a:off x="1779855" y="1441978"/>
             <a:ext cx="1244184" cy="1124261"/>
           </a:xfrm>
           <a:prstGeom prst="rect">
@@ -5525,7 +5029,7 @@
           <a:lstStyle/>
           <a:p>
             <a:pPr algn="ctr"/>
-            <a:endParaRPr lang="es-ES"/>
+            <a:endParaRPr lang="en-US" noProof="0" dirty="0"/>
           </a:p>
         </p:txBody>
       </p:sp>
@@ -5543,7 +5047,7 @@
         </p:nvSpPr>
         <p:spPr>
           <a:xfrm>
-            <a:off x="1510259" y="1859205"/>
+            <a:off x="1932255" y="1594378"/>
             <a:ext cx="1244184" cy="1124261"/>
           </a:xfrm>
           <a:prstGeom prst="rect">
@@ -5576,7 +5080,7 @@
           <a:lstStyle/>
           <a:p>
             <a:pPr algn="ctr"/>
-            <a:endParaRPr lang="es-ES"/>
+            <a:endParaRPr lang="en-US" noProof="0" dirty="0"/>
           </a:p>
         </p:txBody>
       </p:sp>
@@ -5594,7 +5098,7 @@
         </p:nvSpPr>
         <p:spPr>
           <a:xfrm>
-            <a:off x="1662659" y="2011605"/>
+            <a:off x="2084655" y="1746778"/>
             <a:ext cx="1244184" cy="1124261"/>
           </a:xfrm>
           <a:prstGeom prst="rect">
@@ -5627,7 +5131,7 @@
           <a:lstStyle/>
           <a:p>
             <a:pPr algn="ctr"/>
-            <a:endParaRPr lang="es-ES"/>
+            <a:endParaRPr lang="en-US" noProof="0" dirty="0"/>
           </a:p>
         </p:txBody>
       </p:sp>
@@ -5659,7 +5163,7 @@
         </p:blipFill>
         <p:spPr>
           <a:xfrm>
-            <a:off x="1818493" y="2072035"/>
+            <a:off x="2240489" y="1807208"/>
             <a:ext cx="1088350" cy="1088350"/>
           </a:xfrm>
           <a:prstGeom prst="rect">
@@ -5695,7 +5199,7 @@
         </p:blipFill>
         <p:spPr>
           <a:xfrm>
-            <a:off x="6252860" y="1062263"/>
+            <a:off x="6751475" y="811009"/>
             <a:ext cx="1781224" cy="1088350"/>
           </a:xfrm>
           <a:prstGeom prst="rect">
@@ -5741,7 +5245,7 @@
         </p:blipFill>
         <p:spPr>
           <a:xfrm>
-            <a:off x="7018031" y="1913756"/>
+            <a:off x="7516646" y="1662502"/>
             <a:ext cx="1631294" cy="1022157"/>
           </a:xfrm>
           <a:prstGeom prst="rect">
@@ -5787,7 +5291,7 @@
         </p:blipFill>
         <p:spPr>
           <a:xfrm>
-            <a:off x="7535713" y="2787379"/>
+            <a:off x="8034328" y="2536125"/>
             <a:ext cx="1626190" cy="1027384"/>
           </a:xfrm>
           <a:prstGeom prst="rect">
@@ -5833,7 +5337,7 @@
         </p:blipFill>
         <p:spPr>
           <a:xfrm>
-            <a:off x="8064187" y="3620078"/>
+            <a:off x="8562802" y="3368824"/>
             <a:ext cx="1580874" cy="973284"/>
           </a:xfrm>
           <a:prstGeom prst="rect">
@@ -5879,7 +5383,7 @@
         </p:blipFill>
         <p:spPr>
           <a:xfrm>
-            <a:off x="8407015" y="4359779"/>
+            <a:off x="8905630" y="4108525"/>
             <a:ext cx="1715484" cy="977174"/>
           </a:xfrm>
           <a:prstGeom prst="rect">
@@ -5925,7 +5429,7 @@
         </p:blipFill>
         <p:spPr>
           <a:xfrm>
-            <a:off x="8828251" y="5277527"/>
+            <a:off x="9326866" y="5026273"/>
             <a:ext cx="1715485" cy="1064681"/>
           </a:xfrm>
           <a:prstGeom prst="rect">
@@ -5943,10 +5447,807 @@
           </a:effectLst>
         </p:spPr>
       </p:pic>
+      <p:sp>
+        <p:nvSpPr>
+          <p:cNvPr id="2" name="Speech Bubble: Rectangle with Corners Rounded 23">
+            <a:extLst>
+              <a:ext uri="{FF2B5EF4-FFF2-40B4-BE49-F238E27FC236}">
+                <a16:creationId xmlns:a16="http://schemas.microsoft.com/office/drawing/2014/main" id="{3C83C836-4418-0690-7B5A-10A85DD41023}"/>
+              </a:ext>
+            </a:extLst>
+          </p:cNvPr>
+          <p:cNvSpPr/>
+          <p:nvPr/>
+        </p:nvSpPr>
+        <p:spPr>
+          <a:xfrm>
+            <a:off x="4269784" y="1098281"/>
+            <a:ext cx="983224" cy="612522"/>
+          </a:xfrm>
+          <a:prstGeom prst="wedgeRoundRectCallout">
+            <a:avLst>
+              <a:gd name="adj1" fmla="val 68135"/>
+              <a:gd name="adj2" fmla="val 24386"/>
+              <a:gd name="adj3" fmla="val 16667"/>
+            </a:avLst>
+          </a:prstGeom>
+          <a:solidFill>
+            <a:schemeClr val="bg1"/>
+          </a:solidFill>
+        </p:spPr>
+        <p:style>
+          <a:lnRef idx="2">
+            <a:schemeClr val="accent1">
+              <a:shade val="15000"/>
+            </a:schemeClr>
+          </a:lnRef>
+          <a:fillRef idx="1">
+            <a:schemeClr val="accent1"/>
+          </a:fillRef>
+          <a:effectRef idx="0">
+            <a:schemeClr val="accent1"/>
+          </a:effectRef>
+          <a:fontRef idx="minor">
+            <a:schemeClr val="lt1"/>
+          </a:fontRef>
+        </p:style>
+        <p:txBody>
+          <a:bodyPr rtlCol="0" anchor="ctr"/>
+          <a:lstStyle/>
+          <a:p>
+            <a:pPr algn="ctr"/>
+            <a:endParaRPr lang="en-US" noProof="0" dirty="0"/>
+          </a:p>
+        </p:txBody>
+      </p:sp>
+      <p:sp>
+        <p:nvSpPr>
+          <p:cNvPr id="3" name="TextBox 2">
+            <a:extLst>
+              <a:ext uri="{FF2B5EF4-FFF2-40B4-BE49-F238E27FC236}">
+                <a16:creationId xmlns:a16="http://schemas.microsoft.com/office/drawing/2014/main" id="{C8B7E42D-2964-B9D2-17CC-1BA631F23340}"/>
+              </a:ext>
+            </a:extLst>
+          </p:cNvPr>
+          <p:cNvSpPr txBox="1"/>
+          <p:nvPr/>
+        </p:nvSpPr>
+        <p:spPr>
+          <a:xfrm>
+            <a:off x="4269784" y="1221337"/>
+            <a:ext cx="983224" cy="369332"/>
+          </a:xfrm>
+          <a:prstGeom prst="rect">
+            <a:avLst/>
+          </a:prstGeom>
+          <a:noFill/>
+        </p:spPr>
+        <p:txBody>
+          <a:bodyPr wrap="square" rtlCol="0">
+            <a:spAutoFit/>
+          </a:bodyPr>
+          <a:lstStyle/>
+          <a:p>
+            <a:pPr algn="ctr"/>
+            <a:r>
+              <a:rPr lang="en-US" noProof="0" dirty="0">
+                <a:latin typeface="Helvetica Neue" panose="02000503000000020004" pitchFamily="2" charset="0"/>
+                <a:ea typeface="Helvetica Neue" panose="02000503000000020004" pitchFamily="2" charset="0"/>
+                <a:cs typeface="Helvetica Neue" panose="02000503000000020004" pitchFamily="2" charset="0"/>
+              </a:rPr>
+              <a:t>pig</a:t>
+            </a:r>
+          </a:p>
+        </p:txBody>
+      </p:sp>
+      <p:sp>
+        <p:nvSpPr>
+          <p:cNvPr id="8" name="Rounded Rectangle 7">
+            <a:extLst>
+              <a:ext uri="{FF2B5EF4-FFF2-40B4-BE49-F238E27FC236}">
+                <a16:creationId xmlns:a16="http://schemas.microsoft.com/office/drawing/2014/main" id="{FE787F86-CCAD-F719-0CC4-B10B70BB4AEE}"/>
+              </a:ext>
+            </a:extLst>
+          </p:cNvPr>
+          <p:cNvSpPr/>
+          <p:nvPr/>
+        </p:nvSpPr>
+        <p:spPr>
+          <a:xfrm>
+            <a:off x="686510" y="61993"/>
+            <a:ext cx="5409490" cy="3139759"/>
+          </a:xfrm>
+          <a:prstGeom prst="roundRect">
+            <a:avLst/>
+          </a:prstGeom>
+          <a:noFill/>
+        </p:spPr>
+        <p:style>
+          <a:lnRef idx="2">
+            <a:schemeClr val="accent1">
+              <a:shade val="15000"/>
+            </a:schemeClr>
+          </a:lnRef>
+          <a:fillRef idx="1">
+            <a:schemeClr val="accent1"/>
+          </a:fillRef>
+          <a:effectRef idx="0">
+            <a:schemeClr val="accent1"/>
+          </a:effectRef>
+          <a:fontRef idx="minor">
+            <a:schemeClr val="lt1"/>
+          </a:fontRef>
+        </p:style>
+        <p:txBody>
+          <a:bodyPr rtlCol="0" anchor="ctr"/>
+          <a:lstStyle/>
+          <a:p>
+            <a:pPr algn="ctr"/>
+            <a:endParaRPr lang="en-US" noProof="0" dirty="0"/>
+          </a:p>
+        </p:txBody>
+      </p:sp>
+      <p:sp>
+        <p:nvSpPr>
+          <p:cNvPr id="9" name="Rounded Rectangle 8">
+            <a:extLst>
+              <a:ext uri="{FF2B5EF4-FFF2-40B4-BE49-F238E27FC236}">
+                <a16:creationId xmlns:a16="http://schemas.microsoft.com/office/drawing/2014/main" id="{E51A8388-9651-7794-3EC2-B45489DE35C7}"/>
+              </a:ext>
+            </a:extLst>
+          </p:cNvPr>
+          <p:cNvSpPr/>
+          <p:nvPr/>
+        </p:nvSpPr>
+        <p:spPr>
+          <a:xfrm>
+            <a:off x="686510" y="3297724"/>
+            <a:ext cx="5409490" cy="3275354"/>
+          </a:xfrm>
+          <a:prstGeom prst="roundRect">
+            <a:avLst/>
+          </a:prstGeom>
+          <a:noFill/>
+        </p:spPr>
+        <p:style>
+          <a:lnRef idx="2">
+            <a:schemeClr val="accent1">
+              <a:shade val="15000"/>
+            </a:schemeClr>
+          </a:lnRef>
+          <a:fillRef idx="1">
+            <a:schemeClr val="accent1"/>
+          </a:fillRef>
+          <a:effectRef idx="0">
+            <a:schemeClr val="accent1"/>
+          </a:effectRef>
+          <a:fontRef idx="minor">
+            <a:schemeClr val="lt1"/>
+          </a:fontRef>
+        </p:style>
+        <p:txBody>
+          <a:bodyPr rtlCol="0" anchor="ctr"/>
+          <a:lstStyle/>
+          <a:p>
+            <a:pPr algn="ctr"/>
+            <a:endParaRPr lang="en-US" noProof="0" dirty="0"/>
+          </a:p>
+        </p:txBody>
+      </p:sp>
+      <p:sp>
+        <p:nvSpPr>
+          <p:cNvPr id="11" name="TextBox 10">
+            <a:extLst>
+              <a:ext uri="{FF2B5EF4-FFF2-40B4-BE49-F238E27FC236}">
+                <a16:creationId xmlns:a16="http://schemas.microsoft.com/office/drawing/2014/main" id="{8F15CD89-9E21-5839-0306-E6490CB7FFFC}"/>
+              </a:ext>
+            </a:extLst>
+          </p:cNvPr>
+          <p:cNvSpPr txBox="1"/>
+          <p:nvPr/>
+        </p:nvSpPr>
+        <p:spPr>
+          <a:xfrm>
+            <a:off x="-132917" y="91447"/>
+            <a:ext cx="6734628" cy="369332"/>
+          </a:xfrm>
+          <a:prstGeom prst="rect">
+            <a:avLst/>
+          </a:prstGeom>
+          <a:noFill/>
+        </p:spPr>
+        <p:txBody>
+          <a:bodyPr wrap="square">
+            <a:spAutoFit/>
+          </a:bodyPr>
+          <a:lstStyle/>
+          <a:p>
+            <a:pPr algn="ctr"/>
+            <a:r>
+              <a:rPr lang="en-US" sz="1800" b="1" noProof="0" dirty="0">
+                <a:solidFill>
+                  <a:schemeClr val="tx1"/>
+                </a:solidFill>
+                <a:latin typeface="Helvetica Neue" panose="02000503000000020004" pitchFamily="2" charset="0"/>
+                <a:ea typeface="Helvetica Neue" panose="02000503000000020004" pitchFamily="2" charset="0"/>
+                <a:cs typeface="Helvetica Neue" panose="02000503000000020004" pitchFamily="2" charset="0"/>
+              </a:rPr>
+              <a:t>Animal Stroop Task</a:t>
+            </a:r>
+          </a:p>
+        </p:txBody>
+      </p:sp>
+      <p:sp>
+        <p:nvSpPr>
+          <p:cNvPr id="13" name="TextBox 12">
+            <a:extLst>
+              <a:ext uri="{FF2B5EF4-FFF2-40B4-BE49-F238E27FC236}">
+                <a16:creationId xmlns:a16="http://schemas.microsoft.com/office/drawing/2014/main" id="{F2E4E448-9BDE-148F-085E-9448F81F7BEC}"/>
+              </a:ext>
+            </a:extLst>
+          </p:cNvPr>
+          <p:cNvSpPr txBox="1"/>
+          <p:nvPr/>
+        </p:nvSpPr>
+        <p:spPr>
+          <a:xfrm>
+            <a:off x="5505659" y="111985"/>
+            <a:ext cx="6799942" cy="369332"/>
+          </a:xfrm>
+          <a:prstGeom prst="rect">
+            <a:avLst/>
+          </a:prstGeom>
+          <a:noFill/>
+        </p:spPr>
+        <p:txBody>
+          <a:bodyPr wrap="square">
+            <a:spAutoFit/>
+          </a:bodyPr>
+          <a:lstStyle/>
+          <a:p>
+            <a:pPr algn="ctr"/>
+            <a:r>
+              <a:rPr lang="en-US" sz="1800" b="1" kern="1200" noProof="0" dirty="0">
+                <a:solidFill>
+                  <a:schemeClr val="tx1"/>
+                </a:solidFill>
+                <a:latin typeface="Helvetica Neue" panose="02000503000000020004" pitchFamily="2" charset="0"/>
+                <a:ea typeface="Helvetica Neue" panose="02000503000000020004" pitchFamily="2" charset="0"/>
+                <a:cs typeface="Helvetica Neue" panose="02000503000000020004" pitchFamily="2" charset="0"/>
+              </a:rPr>
+              <a:t>Theory of Mind (</a:t>
+            </a:r>
+            <a:r>
+              <a:rPr lang="en-US" sz="1800" b="1" kern="1200" noProof="0" dirty="0" err="1">
+                <a:solidFill>
+                  <a:schemeClr val="tx1"/>
+                </a:solidFill>
+                <a:latin typeface="Helvetica Neue" panose="02000503000000020004" pitchFamily="2" charset="0"/>
+                <a:ea typeface="Helvetica Neue" panose="02000503000000020004" pitchFamily="2" charset="0"/>
+                <a:cs typeface="Helvetica Neue" panose="02000503000000020004" pitchFamily="2" charset="0"/>
+              </a:rPr>
+              <a:t>ToM</a:t>
+            </a:r>
+            <a:r>
+              <a:rPr lang="en-US" sz="1800" b="1" kern="1200" noProof="0" dirty="0">
+                <a:solidFill>
+                  <a:schemeClr val="tx1"/>
+                </a:solidFill>
+                <a:latin typeface="Helvetica Neue" panose="02000503000000020004" pitchFamily="2" charset="0"/>
+                <a:ea typeface="Helvetica Neue" panose="02000503000000020004" pitchFamily="2" charset="0"/>
+                <a:cs typeface="Helvetica Neue" panose="02000503000000020004" pitchFamily="2" charset="0"/>
+              </a:rPr>
+              <a:t>) task</a:t>
+            </a:r>
+          </a:p>
+        </p:txBody>
+      </p:sp>
+      <p:sp>
+        <p:nvSpPr>
+          <p:cNvPr id="15" name="TextBox 14">
+            <a:extLst>
+              <a:ext uri="{FF2B5EF4-FFF2-40B4-BE49-F238E27FC236}">
+                <a16:creationId xmlns:a16="http://schemas.microsoft.com/office/drawing/2014/main" id="{2A15E10C-0D9B-F859-7DE4-C6F93B2F318E}"/>
+              </a:ext>
+            </a:extLst>
+          </p:cNvPr>
+          <p:cNvSpPr txBox="1"/>
+          <p:nvPr/>
+        </p:nvSpPr>
+        <p:spPr>
+          <a:xfrm>
+            <a:off x="276042" y="3418865"/>
+            <a:ext cx="6197600" cy="369332"/>
+          </a:xfrm>
+          <a:prstGeom prst="rect">
+            <a:avLst/>
+          </a:prstGeom>
+          <a:noFill/>
+        </p:spPr>
+        <p:txBody>
+          <a:bodyPr wrap="square">
+            <a:spAutoFit/>
+          </a:bodyPr>
+          <a:lstStyle/>
+          <a:p>
+            <a:pPr algn="ctr"/>
+            <a:r>
+              <a:rPr lang="en-US" sz="1800" b="1" noProof="0" dirty="0">
+                <a:solidFill>
+                  <a:schemeClr val="tx1"/>
+                </a:solidFill>
+                <a:latin typeface="Helvetica Neue" panose="02000503000000020004" pitchFamily="2" charset="0"/>
+                <a:ea typeface="Helvetica Neue" panose="02000503000000020004" pitchFamily="2" charset="0"/>
+                <a:cs typeface="Helvetica Neue" panose="02000503000000020004" pitchFamily="2" charset="0"/>
+              </a:rPr>
+              <a:t>Digit </a:t>
+            </a:r>
+            <a:r>
+              <a:rPr lang="en-US" sz="1800" b="1" kern="1200" noProof="0" dirty="0">
+                <a:solidFill>
+                  <a:schemeClr val="tx1"/>
+                </a:solidFill>
+                <a:latin typeface="Helvetica Neue" panose="02000503000000020004" pitchFamily="2" charset="0"/>
+                <a:ea typeface="Helvetica Neue" panose="02000503000000020004" pitchFamily="2" charset="0"/>
+                <a:cs typeface="Helvetica Neue" panose="02000503000000020004" pitchFamily="2" charset="0"/>
+              </a:rPr>
+              <a:t>Span</a:t>
+            </a:r>
+            <a:r>
+              <a:rPr lang="en-US" sz="1800" b="1" noProof="0" dirty="0">
+                <a:solidFill>
+                  <a:schemeClr val="tx1"/>
+                </a:solidFill>
+                <a:latin typeface="Helvetica Neue" panose="02000503000000020004" pitchFamily="2" charset="0"/>
+                <a:ea typeface="Helvetica Neue" panose="02000503000000020004" pitchFamily="2" charset="0"/>
+                <a:cs typeface="Helvetica Neue" panose="02000503000000020004" pitchFamily="2" charset="0"/>
+              </a:rPr>
+              <a:t> Task</a:t>
+            </a:r>
+          </a:p>
+        </p:txBody>
+      </p:sp>
+      <p:graphicFrame>
+        <p:nvGraphicFramePr>
+          <p:cNvPr id="17" name="Table 16">
+            <a:extLst>
+              <a:ext uri="{FF2B5EF4-FFF2-40B4-BE49-F238E27FC236}">
+                <a16:creationId xmlns:a16="http://schemas.microsoft.com/office/drawing/2014/main" id="{05077864-5309-8374-A556-E1B1A9C18E22}"/>
+              </a:ext>
+            </a:extLst>
+          </p:cNvPr>
+          <p:cNvGraphicFramePr>
+            <a:graphicFrameLocks noGrp="1"/>
+          </p:cNvGraphicFramePr>
+          <p:nvPr>
+            <p:extLst>
+              <p:ext uri="{D42A27DB-BD31-4B8C-83A1-F6EECF244321}">
+                <p14:modId xmlns:p14="http://schemas.microsoft.com/office/powerpoint/2010/main" val="2293965045"/>
+              </p:ext>
+            </p:extLst>
+          </p:nvPr>
+        </p:nvGraphicFramePr>
+        <p:xfrm>
+          <a:off x="864441" y="3806816"/>
+          <a:ext cx="5037940" cy="720000"/>
+        </p:xfrm>
+        <a:graphic>
+          <a:graphicData uri="http://schemas.openxmlformats.org/drawingml/2006/table">
+            <a:tbl>
+              <a:tblPr firstRow="1" bandRow="1">
+                <a:tableStyleId>{5C22544A-7EE6-4342-B048-85BDC9FD1C3A}</a:tableStyleId>
+              </a:tblPr>
+              <a:tblGrid>
+                <a:gridCol w="2518970">
+                  <a:extLst>
+                    <a:ext uri="{9D8B030D-6E8A-4147-A177-3AD203B41FA5}">
+                      <a16:colId xmlns:a16="http://schemas.microsoft.com/office/drawing/2014/main" val="3284472281"/>
+                    </a:ext>
+                  </a:extLst>
+                </a:gridCol>
+                <a:gridCol w="2518970">
+                  <a:extLst>
+                    <a:ext uri="{9D8B030D-6E8A-4147-A177-3AD203B41FA5}">
+                      <a16:colId xmlns:a16="http://schemas.microsoft.com/office/drawing/2014/main" val="1172645948"/>
+                    </a:ext>
+                  </a:extLst>
+                </a:gridCol>
+              </a:tblGrid>
+              <a:tr h="360000">
+                <a:tc>
+                  <a:txBody>
+                    <a:bodyPr/>
+                    <a:lstStyle/>
+                    <a:p>
+                      <a:pPr marL="0" marR="0" lvl="0" indent="0" algn="ctr" defTabSz="914400" rtl="0" eaLnBrk="1" fontAlgn="auto" latinLnBrk="0" hangingPunct="1">
+                        <a:lnSpc>
+                          <a:spcPct val="100000"/>
+                        </a:lnSpc>
+                        <a:spcBef>
+                          <a:spcPts val="0"/>
+                        </a:spcBef>
+                        <a:spcAft>
+                          <a:spcPts val="0"/>
+                        </a:spcAft>
+                        <a:buClrTx/>
+                        <a:buSzTx/>
+                        <a:buFontTx/>
+                        <a:buNone/>
+                        <a:tabLst/>
+                        <a:defRPr/>
+                      </a:pPr>
+                      <a:r>
+                        <a:rPr lang="es-ES" sz="1600" noProof="1">
+                          <a:solidFill>
+                            <a:schemeClr val="tx1"/>
+                          </a:solidFill>
+                          <a:latin typeface="Helvetica Neue" panose="02000503000000020004" pitchFamily="2" charset="0"/>
+                          <a:ea typeface="Helvetica Neue" panose="02000503000000020004" pitchFamily="2" charset="0"/>
+                          <a:cs typeface="Helvetica Neue" panose="02000503000000020004" pitchFamily="2" charset="0"/>
+                        </a:rPr>
+                        <a:t>Forward Digit Span</a:t>
+                      </a:r>
+                    </a:p>
+                  </a:txBody>
+                  <a:tcPr anchor="ctr">
+                    <a:lnL w="12700" cmpd="sng">
+                      <a:noFill/>
+                    </a:lnL>
+                    <a:lnR w="12700" cmpd="sng">
+                      <a:noFill/>
+                    </a:lnR>
+                    <a:lnT w="12700" cmpd="sng">
+                      <a:noFill/>
+                    </a:lnT>
+                    <a:lnB w="38100" cmpd="sng">
+                      <a:noFill/>
+                    </a:lnB>
+                    <a:lnTlToBr w="12700" cmpd="sng">
+                      <a:noFill/>
+                      <a:prstDash val="solid"/>
+                    </a:lnTlToBr>
+                    <a:lnBlToTr w="12700" cmpd="sng">
+                      <a:noFill/>
+                      <a:prstDash val="solid"/>
+                    </a:lnBlToTr>
+                    <a:noFill/>
+                  </a:tcPr>
+                </a:tc>
+                <a:tc>
+                  <a:txBody>
+                    <a:bodyPr/>
+                    <a:lstStyle/>
+                    <a:p>
+                      <a:pPr marL="0" marR="0" lvl="0" indent="0" algn="ctr" defTabSz="914400" rtl="0" eaLnBrk="1" fontAlgn="auto" latinLnBrk="0" hangingPunct="1">
+                        <a:lnSpc>
+                          <a:spcPct val="100000"/>
+                        </a:lnSpc>
+                        <a:spcBef>
+                          <a:spcPts val="0"/>
+                        </a:spcBef>
+                        <a:spcAft>
+                          <a:spcPts val="0"/>
+                        </a:spcAft>
+                        <a:buClrTx/>
+                        <a:buSzTx/>
+                        <a:buFontTx/>
+                        <a:buNone/>
+                        <a:tabLst/>
+                        <a:defRPr/>
+                      </a:pPr>
+                      <a:r>
+                        <a:rPr lang="es-ES" sz="1600" noProof="1">
+                          <a:solidFill>
+                            <a:schemeClr val="tx1"/>
+                          </a:solidFill>
+                          <a:latin typeface="Helvetica Neue" panose="02000503000000020004" pitchFamily="2" charset="0"/>
+                          <a:ea typeface="Helvetica Neue" panose="02000503000000020004" pitchFamily="2" charset="0"/>
+                          <a:cs typeface="Helvetica Neue" panose="02000503000000020004" pitchFamily="2" charset="0"/>
+                        </a:rPr>
+                        <a:t>Backward Digit Span</a:t>
+                      </a:r>
+                    </a:p>
+                  </a:txBody>
+                  <a:tcPr anchor="ctr">
+                    <a:lnL w="12700" cmpd="sng">
+                      <a:noFill/>
+                    </a:lnL>
+                    <a:lnR w="12700" cmpd="sng">
+                      <a:noFill/>
+                    </a:lnR>
+                    <a:lnT w="12700" cmpd="sng">
+                      <a:noFill/>
+                    </a:lnT>
+                    <a:lnB w="38100" cmpd="sng">
+                      <a:noFill/>
+                    </a:lnB>
+                    <a:lnTlToBr w="12700" cmpd="sng">
+                      <a:noFill/>
+                      <a:prstDash val="solid"/>
+                    </a:lnTlToBr>
+                    <a:lnBlToTr w="12700" cmpd="sng">
+                      <a:noFill/>
+                      <a:prstDash val="solid"/>
+                    </a:lnBlToTr>
+                    <a:noFill/>
+                  </a:tcPr>
+                </a:tc>
+                <a:extLst>
+                  <a:ext uri="{0D108BD9-81ED-4DB2-BD59-A6C34878D82A}">
+                    <a16:rowId xmlns:a16="http://schemas.microsoft.com/office/drawing/2014/main" val="3126079159"/>
+                  </a:ext>
+                </a:extLst>
+              </a:tr>
+              <a:tr h="360000">
+                <a:tc>
+                  <a:txBody>
+                    <a:bodyPr/>
+                    <a:lstStyle/>
+                    <a:p>
+                      <a:pPr marL="0" marR="0" lvl="0" indent="0" algn="ctr" defTabSz="914400" rtl="0" eaLnBrk="1" fontAlgn="auto" latinLnBrk="0" hangingPunct="1">
+                        <a:lnSpc>
+                          <a:spcPct val="100000"/>
+                        </a:lnSpc>
+                        <a:spcBef>
+                          <a:spcPts val="0"/>
+                        </a:spcBef>
+                        <a:spcAft>
+                          <a:spcPts val="0"/>
+                        </a:spcAft>
+                        <a:buClrTx/>
+                        <a:buSzTx/>
+                        <a:buFontTx/>
+                        <a:buNone/>
+                        <a:tabLst/>
+                        <a:defRPr/>
+                      </a:pPr>
+                      <a:r>
+                        <a:rPr lang="es-ES" sz="1600" noProof="1">
+                          <a:solidFill>
+                            <a:schemeClr val="tx1"/>
+                          </a:solidFill>
+                          <a:latin typeface="Helvetica Neue" panose="02000503000000020004" pitchFamily="2" charset="0"/>
+                          <a:ea typeface="Helvetica Neue" panose="02000503000000020004" pitchFamily="2" charset="0"/>
+                          <a:cs typeface="Helvetica Neue" panose="02000503000000020004" pitchFamily="2" charset="0"/>
+                        </a:rPr>
+                        <a:t>Short-term memory</a:t>
+                      </a:r>
+                    </a:p>
+                  </a:txBody>
+                  <a:tcPr anchor="ctr">
+                    <a:lnL w="12700" cmpd="sng">
+                      <a:noFill/>
+                    </a:lnL>
+                    <a:lnR w="12700" cmpd="sng">
+                      <a:noFill/>
+                    </a:lnR>
+                    <a:lnT w="38100" cmpd="sng">
+                      <a:noFill/>
+                    </a:lnT>
+                    <a:lnB w="12700" cmpd="sng">
+                      <a:noFill/>
+                    </a:lnB>
+                    <a:lnTlToBr w="12700" cmpd="sng">
+                      <a:noFill/>
+                      <a:prstDash val="solid"/>
+                    </a:lnTlToBr>
+                    <a:lnBlToTr w="12700" cmpd="sng">
+                      <a:noFill/>
+                      <a:prstDash val="solid"/>
+                    </a:lnBlToTr>
+                    <a:noFill/>
+                  </a:tcPr>
+                </a:tc>
+                <a:tc>
+                  <a:txBody>
+                    <a:bodyPr/>
+                    <a:lstStyle/>
+                    <a:p>
+                      <a:pPr marL="0" marR="0" lvl="0" indent="0" algn="ctr" defTabSz="914400" rtl="0" eaLnBrk="1" fontAlgn="auto" latinLnBrk="0" hangingPunct="1">
+                        <a:lnSpc>
+                          <a:spcPct val="100000"/>
+                        </a:lnSpc>
+                        <a:spcBef>
+                          <a:spcPts val="0"/>
+                        </a:spcBef>
+                        <a:spcAft>
+                          <a:spcPts val="0"/>
+                        </a:spcAft>
+                        <a:buClrTx/>
+                        <a:buSzTx/>
+                        <a:buFontTx/>
+                        <a:buNone/>
+                        <a:tabLst/>
+                        <a:defRPr/>
+                      </a:pPr>
+                      <a:r>
+                        <a:rPr lang="es-ES" sz="1600" dirty="0" err="1">
+                          <a:solidFill>
+                            <a:schemeClr val="tx1"/>
+                          </a:solidFill>
+                          <a:latin typeface="Helvetica Neue" panose="02000503000000020004" pitchFamily="2" charset="0"/>
+                          <a:ea typeface="Helvetica Neue" panose="02000503000000020004" pitchFamily="2" charset="0"/>
+                          <a:cs typeface="Helvetica Neue" panose="02000503000000020004" pitchFamily="2" charset="0"/>
+                        </a:rPr>
+                        <a:t>Working</a:t>
+                      </a:r>
+                      <a:r>
+                        <a:rPr lang="es-ES" sz="1600" dirty="0">
+                          <a:solidFill>
+                            <a:schemeClr val="tx1"/>
+                          </a:solidFill>
+                          <a:latin typeface="Helvetica Neue" panose="02000503000000020004" pitchFamily="2" charset="0"/>
+                          <a:ea typeface="Helvetica Neue" panose="02000503000000020004" pitchFamily="2" charset="0"/>
+                          <a:cs typeface="Helvetica Neue" panose="02000503000000020004" pitchFamily="2" charset="0"/>
+                        </a:rPr>
+                        <a:t> </a:t>
+                      </a:r>
+                      <a:r>
+                        <a:rPr lang="es-ES" sz="1600" dirty="0" err="1">
+                          <a:solidFill>
+                            <a:schemeClr val="tx1"/>
+                          </a:solidFill>
+                          <a:latin typeface="Helvetica Neue" panose="02000503000000020004" pitchFamily="2" charset="0"/>
+                          <a:ea typeface="Helvetica Neue" panose="02000503000000020004" pitchFamily="2" charset="0"/>
+                          <a:cs typeface="Helvetica Neue" panose="02000503000000020004" pitchFamily="2" charset="0"/>
+                        </a:rPr>
+                        <a:t>memory</a:t>
+                      </a:r>
+                      <a:endParaRPr lang="es-ES" sz="1600" dirty="0">
+                        <a:solidFill>
+                          <a:schemeClr val="tx1"/>
+                        </a:solidFill>
+                        <a:latin typeface="Helvetica Neue" panose="02000503000000020004" pitchFamily="2" charset="0"/>
+                        <a:ea typeface="Helvetica Neue" panose="02000503000000020004" pitchFamily="2" charset="0"/>
+                        <a:cs typeface="Helvetica Neue" panose="02000503000000020004" pitchFamily="2" charset="0"/>
+                      </a:endParaRPr>
+                    </a:p>
+                  </a:txBody>
+                  <a:tcPr anchor="ctr">
+                    <a:lnL w="12700" cmpd="sng">
+                      <a:noFill/>
+                    </a:lnL>
+                    <a:lnR w="12700" cmpd="sng">
+                      <a:noFill/>
+                    </a:lnR>
+                    <a:lnT w="38100" cmpd="sng">
+                      <a:noFill/>
+                    </a:lnT>
+                    <a:lnB w="12700" cmpd="sng">
+                      <a:noFill/>
+                    </a:lnB>
+                    <a:lnTlToBr w="12700" cmpd="sng">
+                      <a:noFill/>
+                      <a:prstDash val="solid"/>
+                    </a:lnTlToBr>
+                    <a:lnBlToTr w="12700" cmpd="sng">
+                      <a:noFill/>
+                      <a:prstDash val="solid"/>
+                    </a:lnBlToTr>
+                    <a:noFill/>
+                  </a:tcPr>
+                </a:tc>
+                <a:extLst>
+                  <a:ext uri="{0D108BD9-81ED-4DB2-BD59-A6C34878D82A}">
+                    <a16:rowId xmlns:a16="http://schemas.microsoft.com/office/drawing/2014/main" val="4183802200"/>
+                  </a:ext>
+                </a:extLst>
+              </a:tr>
+            </a:tbl>
+          </a:graphicData>
+        </a:graphic>
+      </p:graphicFrame>
+      <p:sp>
+        <p:nvSpPr>
+          <p:cNvPr id="38" name="Rounded Rectangle 37">
+            <a:extLst>
+              <a:ext uri="{FF2B5EF4-FFF2-40B4-BE49-F238E27FC236}">
+                <a16:creationId xmlns:a16="http://schemas.microsoft.com/office/drawing/2014/main" id="{8531E486-1B0E-4F54-D694-8A5EC906A4AD}"/>
+              </a:ext>
+            </a:extLst>
+          </p:cNvPr>
+          <p:cNvSpPr/>
+          <p:nvPr/>
+        </p:nvSpPr>
+        <p:spPr>
+          <a:xfrm>
+            <a:off x="6395822" y="61993"/>
+            <a:ext cx="5067080" cy="6511085"/>
+          </a:xfrm>
+          <a:prstGeom prst="roundRect">
+            <a:avLst/>
+          </a:prstGeom>
+          <a:noFill/>
+        </p:spPr>
+        <p:style>
+          <a:lnRef idx="2">
+            <a:schemeClr val="accent1">
+              <a:shade val="15000"/>
+            </a:schemeClr>
+          </a:lnRef>
+          <a:fillRef idx="1">
+            <a:schemeClr val="accent1"/>
+          </a:fillRef>
+          <a:effectRef idx="0">
+            <a:schemeClr val="accent1"/>
+          </a:effectRef>
+          <a:fontRef idx="minor">
+            <a:schemeClr val="lt1"/>
+          </a:fontRef>
+        </p:style>
+        <p:txBody>
+          <a:bodyPr rtlCol="0" anchor="ctr"/>
+          <a:lstStyle/>
+          <a:p>
+            <a:pPr algn="ctr"/>
+            <a:endParaRPr lang="en-US" noProof="0" dirty="0"/>
+          </a:p>
+        </p:txBody>
+      </p:sp>
     </p:spTree>
     <p:extLst>
       <p:ext uri="{BB962C8B-B14F-4D97-AF65-F5344CB8AC3E}">
         <p14:creationId xmlns:p14="http://schemas.microsoft.com/office/powerpoint/2010/main" val="954586169"/>
+      </p:ext>
+    </p:extLst>
+  </p:cSld>
+  <p:clrMapOvr>
+    <a:masterClrMapping/>
+  </p:clrMapOvr>
+</p:sld>
+</file>
+
+<file path=ppt/slides/slide2.xml><?xml version="1.0" encoding="utf-8"?>
+<p:sld xmlns:a="http://schemas.openxmlformats.org/drawingml/2006/main" xmlns:r="http://schemas.openxmlformats.org/officeDocument/2006/relationships" xmlns:p="http://schemas.openxmlformats.org/presentationml/2006/main">
+  <p:cSld>
+    <p:spTree>
+      <p:nvGrpSpPr>
+        <p:cNvPr id="1" name=""/>
+        <p:cNvGrpSpPr/>
+        <p:nvPr/>
+      </p:nvGrpSpPr>
+      <p:grpSpPr>
+        <a:xfrm>
+          <a:off x="0" y="0"/>
+          <a:ext cx="0" cy="0"/>
+          <a:chOff x="0" y="0"/>
+          <a:chExt cx="0" cy="0"/>
+        </a:xfrm>
+      </p:grpSpPr>
+      <p:pic>
+        <p:nvPicPr>
+          <p:cNvPr id="37" name="Picture 36">
+            <a:extLst>
+              <a:ext uri="{FF2B5EF4-FFF2-40B4-BE49-F238E27FC236}">
+                <a16:creationId xmlns:a16="http://schemas.microsoft.com/office/drawing/2014/main" id="{37403318-1B53-92CD-79A0-E22DAF5BB4C7}"/>
+              </a:ext>
+            </a:extLst>
+          </p:cNvPr>
+          <p:cNvPicPr>
+            <a:picLocks noChangeAspect="1"/>
+          </p:cNvPicPr>
+          <p:nvPr/>
+        </p:nvPicPr>
+        <p:blipFill>
+          <a:blip r:embed="rId2"/>
+          <a:stretch>
+            <a:fillRect/>
+          </a:stretch>
+        </p:blipFill>
+        <p:spPr>
+          <a:xfrm>
+            <a:off x="2209800" y="1386762"/>
+            <a:ext cx="7772400" cy="4084475"/>
+          </a:xfrm>
+          <a:prstGeom prst="rect">
+            <a:avLst/>
+          </a:prstGeom>
+        </p:spPr>
+      </p:pic>
+    </p:spTree>
+    <p:extLst>
+      <p:ext uri="{BB962C8B-B14F-4D97-AF65-F5344CB8AC3E}">
+        <p14:creationId xmlns:p14="http://schemas.microsoft.com/office/powerpoint/2010/main" val="132621866"/>
       </p:ext>
     </p:extLst>
   </p:cSld>

</xml_diff>